<commit_message>
ISS-4: Add reading X/Y and W/H
Added reading X/Y coordinates and Width/Height for Shape, Picture, Chart and Table elements.
</commit_message>
<xml_diff>
--- a/PptxXML.Tests/Resource/002.pptx
+++ b/PptxXML.Tests/Resource/002.pptx
@@ -152,7 +152,7 @@
               <a:cs typeface="+mn-cs"/>
             </a:defRPr>
           </a:pPr>
-          <a:endParaRPr lang="en-US"/>
+          <a:endParaRPr lang="ru-UA"/>
         </a:p>
       </c:txPr>
     </c:title>
@@ -430,7 +430,7 @@
                 <a:cs typeface="+mn-cs"/>
               </a:defRPr>
             </a:pPr>
-            <a:endParaRPr lang="en-US"/>
+            <a:endParaRPr lang="ru-UA"/>
           </a:p>
         </c:txPr>
         <c:crossAx val="710568552"/>
@@ -489,7 +489,7 @@
                 <a:cs typeface="+mn-cs"/>
               </a:defRPr>
             </a:pPr>
-            <a:endParaRPr lang="en-US"/>
+            <a:endParaRPr lang="ru-UA"/>
           </a:p>
         </c:txPr>
         <c:crossAx val="710567240"/>
@@ -531,7 +531,7 @@
               <a:cs typeface="+mn-cs"/>
             </a:defRPr>
           </a:pPr>
-          <a:endParaRPr lang="en-US"/>
+          <a:endParaRPr lang="ru-UA"/>
         </a:p>
       </c:txPr>
     </c:legend>
@@ -560,7 +560,7 @@
       <a:pPr>
         <a:defRPr/>
       </a:pPr>
-      <a:endParaRPr lang="en-US"/>
+      <a:endParaRPr lang="ru-UA"/>
     </a:p>
   </c:txPr>
   <c:externalData r:id="rId3">
@@ -1261,7 +1261,7 @@
           <a:p>
             <a:fld id="{6A2D1428-0459-4F75-829F-043936AE8C9E}" type="datetimeFigureOut">
               <a:rPr lang="en-US" smtClean="0"/>
-              <a:t>7/13/2019</a:t>
+              <a:t>12/6/2019</a:t>
             </a:fld>
             <a:endParaRPr lang="en-US"/>
           </a:p>
@@ -1461,7 +1461,7 @@
           <a:p>
             <a:fld id="{6A2D1428-0459-4F75-829F-043936AE8C9E}" type="datetimeFigureOut">
               <a:rPr lang="en-US" smtClean="0"/>
-              <a:t>7/13/2019</a:t>
+              <a:t>12/6/2019</a:t>
             </a:fld>
             <a:endParaRPr lang="en-US"/>
           </a:p>
@@ -1671,7 +1671,7 @@
           <a:p>
             <a:fld id="{6A2D1428-0459-4F75-829F-043936AE8C9E}" type="datetimeFigureOut">
               <a:rPr lang="en-US" smtClean="0"/>
-              <a:t>7/13/2019</a:t>
+              <a:t>12/6/2019</a:t>
             </a:fld>
             <a:endParaRPr lang="en-US"/>
           </a:p>
@@ -1871,7 +1871,7 @@
           <a:p>
             <a:fld id="{6A2D1428-0459-4F75-829F-043936AE8C9E}" type="datetimeFigureOut">
               <a:rPr lang="en-US" smtClean="0"/>
-              <a:t>7/13/2019</a:t>
+              <a:t>12/6/2019</a:t>
             </a:fld>
             <a:endParaRPr lang="en-US"/>
           </a:p>
@@ -2147,7 +2147,7 @@
           <a:p>
             <a:fld id="{6A2D1428-0459-4F75-829F-043936AE8C9E}" type="datetimeFigureOut">
               <a:rPr lang="en-US" smtClean="0"/>
-              <a:t>7/13/2019</a:t>
+              <a:t>12/6/2019</a:t>
             </a:fld>
             <a:endParaRPr lang="en-US"/>
           </a:p>
@@ -2415,7 +2415,7 @@
           <a:p>
             <a:fld id="{6A2D1428-0459-4F75-829F-043936AE8C9E}" type="datetimeFigureOut">
               <a:rPr lang="en-US" smtClean="0"/>
-              <a:t>7/13/2019</a:t>
+              <a:t>12/6/2019</a:t>
             </a:fld>
             <a:endParaRPr lang="en-US"/>
           </a:p>
@@ -2830,7 +2830,7 @@
           <a:p>
             <a:fld id="{6A2D1428-0459-4F75-829F-043936AE8C9E}" type="datetimeFigureOut">
               <a:rPr lang="en-US" smtClean="0"/>
-              <a:t>7/13/2019</a:t>
+              <a:t>12/6/2019</a:t>
             </a:fld>
             <a:endParaRPr lang="en-US"/>
           </a:p>
@@ -2972,7 +2972,7 @@
           <a:p>
             <a:fld id="{6A2D1428-0459-4F75-829F-043936AE8C9E}" type="datetimeFigureOut">
               <a:rPr lang="en-US" smtClean="0"/>
-              <a:t>7/13/2019</a:t>
+              <a:t>12/6/2019</a:t>
             </a:fld>
             <a:endParaRPr lang="en-US"/>
           </a:p>
@@ -3085,7 +3085,7 @@
           <a:p>
             <a:fld id="{6A2D1428-0459-4F75-829F-043936AE8C9E}" type="datetimeFigureOut">
               <a:rPr lang="en-US" smtClean="0"/>
-              <a:t>7/13/2019</a:t>
+              <a:t>12/6/2019</a:t>
             </a:fld>
             <a:endParaRPr lang="en-US"/>
           </a:p>
@@ -3398,7 +3398,7 @@
           <a:p>
             <a:fld id="{6A2D1428-0459-4F75-829F-043936AE8C9E}" type="datetimeFigureOut">
               <a:rPr lang="en-US" smtClean="0"/>
-              <a:t>7/13/2019</a:t>
+              <a:t>12/6/2019</a:t>
             </a:fld>
             <a:endParaRPr lang="en-US"/>
           </a:p>
@@ -3687,7 +3687,7 @@
           <a:p>
             <a:fld id="{6A2D1428-0459-4F75-829F-043936AE8C9E}" type="datetimeFigureOut">
               <a:rPr lang="en-US" smtClean="0"/>
-              <a:t>7/13/2019</a:t>
+              <a:t>12/6/2019</a:t>
             </a:fld>
             <a:endParaRPr lang="en-US"/>
           </a:p>
@@ -3930,7 +3930,7 @@
           <a:p>
             <a:fld id="{6A2D1428-0459-4F75-829F-043936AE8C9E}" type="datetimeFigureOut">
               <a:rPr lang="en-US" smtClean="0"/>
-              <a:t>7/13/2019</a:t>
+              <a:t>12/6/2019</a:t>
             </a:fld>
             <a:endParaRPr lang="en-US"/>
           </a:p>
@@ -4347,38 +4347,6 @@
           <a:chExt cx="0" cy="0"/>
         </a:xfrm>
       </p:grpSpPr>
-      <p:sp>
-        <p:nvSpPr>
-          <p:cNvPr id="2" name="Заголовок 1">
-            <a:extLst>
-              <a:ext uri="{FF2B5EF4-FFF2-40B4-BE49-F238E27FC236}">
-                <a16:creationId xmlns:a16="http://schemas.microsoft.com/office/drawing/2014/main" id="{287F069E-5FCC-49F5-9C9D-C412CFAEB4D1}"/>
-              </a:ext>
-            </a:extLst>
-          </p:cNvPr>
-          <p:cNvSpPr>
-            <a:spLocks noGrp="1"/>
-          </p:cNvSpPr>
-          <p:nvPr>
-            <p:ph type="ctrTitle"/>
-          </p:nvPr>
-        </p:nvSpPr>
-        <p:spPr>
-          <a:xfrm>
-            <a:off x="1653208" y="317294"/>
-            <a:ext cx="9144000" cy="795889"/>
-          </a:xfrm>
-        </p:spPr>
-        <p:txBody>
-          <a:bodyPr>
-            <a:normAutofit fontScale="90000"/>
-          </a:bodyPr>
-          <a:lstStyle/>
-          <a:p>
-            <a:endParaRPr lang="en-US" dirty="0"/>
-          </a:p>
-        </p:txBody>
-      </p:sp>
       <p:graphicFrame>
         <p:nvGraphicFramePr>
           <p:cNvPr id="4" name="Таблица 3">
@@ -4441,7 +4409,7 @@
                     <a:bodyPr/>
                     <a:lstStyle/>
                     <a:p>
-                      <a:endParaRPr lang="en-US"/>
+                      <a:endParaRPr lang="en-US" dirty="0"/>
                     </a:p>
                   </a:txBody>
                   <a:tcPr/>
@@ -4458,7 +4426,7 @@
                     <a:bodyPr/>
                     <a:lstStyle/>
                     <a:p>
-                      <a:endParaRPr lang="en-US"/>
+                      <a:endParaRPr lang="en-US" dirty="0"/>
                     </a:p>
                   </a:txBody>
                   <a:tcPr/>
@@ -4547,97 +4515,6 @@
           </a:graphicData>
         </a:graphic>
       </p:graphicFrame>
-      <p:grpSp>
-        <p:nvGrpSpPr>
-          <p:cNvPr id="12" name="Группа 11">
-            <a:extLst>
-              <a:ext uri="{FF2B5EF4-FFF2-40B4-BE49-F238E27FC236}">
-                <a16:creationId xmlns:a16="http://schemas.microsoft.com/office/drawing/2014/main" id="{019508D7-0469-4D49-B178-4374C1ACA208}"/>
-              </a:ext>
-            </a:extLst>
-          </p:cNvPr>
-          <p:cNvGrpSpPr/>
-          <p:nvPr/>
-        </p:nvGrpSpPr>
-        <p:grpSpPr>
-          <a:xfrm>
-            <a:off x="8796130" y="3299791"/>
-            <a:ext cx="655692" cy="1145486"/>
-            <a:chOff x="8796130" y="3299791"/>
-            <a:chExt cx="655692" cy="1145486"/>
-          </a:xfrm>
-        </p:grpSpPr>
-        <p:sp>
-          <p:nvSpPr>
-            <p:cNvPr id="10" name="TextBox 9">
-              <a:extLst>
-                <a:ext uri="{FF2B5EF4-FFF2-40B4-BE49-F238E27FC236}">
-                  <a16:creationId xmlns:a16="http://schemas.microsoft.com/office/drawing/2014/main" id="{170B46B7-8248-4F1E-9B36-4C27187A923D}"/>
-                </a:ext>
-              </a:extLst>
-            </p:cNvPr>
-            <p:cNvSpPr txBox="1"/>
-            <p:nvPr/>
-          </p:nvSpPr>
-          <p:spPr>
-            <a:xfrm>
-              <a:off x="8796130" y="3299791"/>
-              <a:ext cx="655692" cy="369332"/>
-            </a:xfrm>
-            <a:prstGeom prst="rect">
-              <a:avLst/>
-            </a:prstGeom>
-            <a:noFill/>
-          </p:spPr>
-          <p:txBody>
-            <a:bodyPr wrap="none" rtlCol="0">
-              <a:spAutoFit/>
-            </a:bodyPr>
-            <a:lstStyle/>
-            <a:p>
-              <a:r>
-                <a:rPr lang="en-US" dirty="0"/>
-                <a:t>test1</a:t>
-              </a:r>
-            </a:p>
-          </p:txBody>
-        </p:sp>
-        <p:sp>
-          <p:nvSpPr>
-            <p:cNvPr id="11" name="TextBox 10">
-              <a:extLst>
-                <a:ext uri="{FF2B5EF4-FFF2-40B4-BE49-F238E27FC236}">
-                  <a16:creationId xmlns:a16="http://schemas.microsoft.com/office/drawing/2014/main" id="{EE85A577-61F8-43A4-934C-B44EAB657252}"/>
-                </a:ext>
-              </a:extLst>
-            </p:cNvPr>
-            <p:cNvSpPr txBox="1"/>
-            <p:nvPr/>
-          </p:nvSpPr>
-          <p:spPr>
-            <a:xfrm>
-              <a:off x="8796130" y="4075945"/>
-              <a:ext cx="655692" cy="369332"/>
-            </a:xfrm>
-            <a:prstGeom prst="rect">
-              <a:avLst/>
-            </a:prstGeom>
-            <a:noFill/>
-          </p:spPr>
-          <p:txBody>
-            <a:bodyPr wrap="none" rtlCol="0">
-              <a:spAutoFit/>
-            </a:bodyPr>
-            <a:lstStyle/>
-            <a:p>
-              <a:r>
-                <a:rPr lang="en-US" dirty="0"/>
-                <a:t>test1</a:t>
-              </a:r>
-            </a:p>
-          </p:txBody>
-        </p:sp>
-      </p:grpSp>
     </p:spTree>
     <p:extLst>
       <p:ext uri="{BB962C8B-B14F-4D97-AF65-F5344CB8AC3E}">

</xml_diff>